<commit_message>
Added architecture diagram to doc
</commit_message>
<xml_diff>
--- a/_doc/architecture.pptx
+++ b/_doc/architecture.pptx
@@ -3448,7 +3448,7 @@
             <a:p>
               <a:pPr algn="ctr"/>
               <a:r>
-                <a:rPr lang="en-US" dirty="0"/>
+                <a:rPr lang="en-US" sz="1600" dirty="0"/>
                 <a:t>Influx</a:t>
               </a:r>
             </a:p>
@@ -3669,7 +3669,7 @@
             <a:p>
               <a:pPr algn="ctr"/>
               <a:r>
-                <a:rPr lang="en-US" dirty="0"/>
+                <a:rPr lang="en-US" sz="1600" dirty="0"/>
                 <a:t>Influx</a:t>
               </a:r>
             </a:p>
@@ -4216,8 +4216,8 @@
         </p:nvSpPr>
         <p:spPr>
           <a:xfrm>
-            <a:off x="3397558" y="3009959"/>
-            <a:ext cx="1353589" cy="353159"/>
+            <a:off x="3375718" y="3009959"/>
+            <a:ext cx="1375430" cy="353159"/>
           </a:xfrm>
           <a:prstGeom prst="rect">
             <a:avLst/>
@@ -4245,8 +4245,8 @@
           <a:p>
             <a:pPr algn="ctr"/>
             <a:r>
-              <a:rPr lang="en-US" dirty="0"/>
-              <a:t>MQTT Bus</a:t>
+              <a:rPr lang="en-US" sz="1600" dirty="0"/>
+              <a:t>MQTT Broker</a:t>
             </a:r>
           </a:p>
         </p:txBody>
@@ -4294,10 +4294,10 @@
           <a:p>
             <a:pPr algn="ctr"/>
             <a:r>
-              <a:rPr lang="en-US" dirty="0" err="1"/>
+              <a:rPr lang="en-US" sz="1600" dirty="0" err="1"/>
               <a:t>sensor_loop</a:t>
             </a:r>
-            <a:endParaRPr lang="en-US" dirty="0"/>
+            <a:endParaRPr lang="en-US" sz="1600" dirty="0"/>
           </a:p>
         </p:txBody>
       </p:sp>
@@ -4311,6 +4311,7 @@
             </a:extLst>
           </p:cNvPr>
           <p:cNvCxnSpPr>
+            <a:cxnSpLocks/>
             <a:endCxn id="41" idx="1"/>
           </p:cNvCxnSpPr>
           <p:nvPr/>
@@ -4318,7 +4319,7 @@
         <p:spPr>
           <a:xfrm>
             <a:off x="3071807" y="3186538"/>
-            <a:ext cx="325751" cy="1"/>
+            <a:ext cx="303911" cy="1"/>
           </a:xfrm>
           <a:prstGeom prst="straightConnector1">
             <a:avLst/>
@@ -4444,8 +4445,8 @@
           <a:p>
             <a:pPr algn="ctr"/>
             <a:r>
-              <a:rPr lang="en-US" dirty="0"/>
-              <a:t>MQTT Bus</a:t>
+              <a:rPr lang="en-US" sz="1600" dirty="0"/>
+              <a:t>MQTT Broker</a:t>
             </a:r>
           </a:p>
         </p:txBody>
@@ -4534,7 +4535,7 @@
           <a:p>
             <a:pPr algn="ctr"/>
             <a:r>
-              <a:rPr lang="en-US" dirty="0"/>
+              <a:rPr lang="en-US" sz="1600" dirty="0"/>
               <a:t>Grafana</a:t>
             </a:r>
           </a:p>
@@ -4583,7 +4584,7 @@
           <a:p>
             <a:pPr algn="ctr"/>
             <a:r>
-              <a:rPr lang="en-US" dirty="0"/>
+              <a:rPr lang="en-US" sz="1600" dirty="0"/>
               <a:t>Prometheus</a:t>
             </a:r>
           </a:p>

</xml_diff>

<commit_message>
Update ROADMAP.md and doc
</commit_message>
<xml_diff>
--- a/_doc/architecture.pptx
+++ b/_doc/architecture.pptx
@@ -259,7 +259,7 @@
           <a:p>
             <a:fld id="{7E19F9DA-EED9-48BD-8697-73F995D738AF}" type="datetimeFigureOut">
               <a:rPr lang="en-US" smtClean="0"/>
-              <a:t>5/23/2021</a:t>
+              <a:t>6/2/2021</a:t>
             </a:fld>
             <a:endParaRPr lang="en-US"/>
           </a:p>
@@ -457,7 +457,7 @@
           <a:p>
             <a:fld id="{7E19F9DA-EED9-48BD-8697-73F995D738AF}" type="datetimeFigureOut">
               <a:rPr lang="en-US" smtClean="0"/>
-              <a:t>5/23/2021</a:t>
+              <a:t>6/2/2021</a:t>
             </a:fld>
             <a:endParaRPr lang="en-US"/>
           </a:p>
@@ -665,7 +665,7 @@
           <a:p>
             <a:fld id="{7E19F9DA-EED9-48BD-8697-73F995D738AF}" type="datetimeFigureOut">
               <a:rPr lang="en-US" smtClean="0"/>
-              <a:t>5/23/2021</a:t>
+              <a:t>6/2/2021</a:t>
             </a:fld>
             <a:endParaRPr lang="en-US"/>
           </a:p>
@@ -863,7 +863,7 @@
           <a:p>
             <a:fld id="{7E19F9DA-EED9-48BD-8697-73F995D738AF}" type="datetimeFigureOut">
               <a:rPr lang="en-US" smtClean="0"/>
-              <a:t>5/23/2021</a:t>
+              <a:t>6/2/2021</a:t>
             </a:fld>
             <a:endParaRPr lang="en-US"/>
           </a:p>
@@ -1138,7 +1138,7 @@
           <a:p>
             <a:fld id="{7E19F9DA-EED9-48BD-8697-73F995D738AF}" type="datetimeFigureOut">
               <a:rPr lang="en-US" smtClean="0"/>
-              <a:t>5/23/2021</a:t>
+              <a:t>6/2/2021</a:t>
             </a:fld>
             <a:endParaRPr lang="en-US"/>
           </a:p>
@@ -1403,7 +1403,7 @@
           <a:p>
             <a:fld id="{7E19F9DA-EED9-48BD-8697-73F995D738AF}" type="datetimeFigureOut">
               <a:rPr lang="en-US" smtClean="0"/>
-              <a:t>5/23/2021</a:t>
+              <a:t>6/2/2021</a:t>
             </a:fld>
             <a:endParaRPr lang="en-US"/>
           </a:p>
@@ -1815,7 +1815,7 @@
           <a:p>
             <a:fld id="{7E19F9DA-EED9-48BD-8697-73F995D738AF}" type="datetimeFigureOut">
               <a:rPr lang="en-US" smtClean="0"/>
-              <a:t>5/23/2021</a:t>
+              <a:t>6/2/2021</a:t>
             </a:fld>
             <a:endParaRPr lang="en-US"/>
           </a:p>
@@ -1956,7 +1956,7 @@
           <a:p>
             <a:fld id="{7E19F9DA-EED9-48BD-8697-73F995D738AF}" type="datetimeFigureOut">
               <a:rPr lang="en-US" smtClean="0"/>
-              <a:t>5/23/2021</a:t>
+              <a:t>6/2/2021</a:t>
             </a:fld>
             <a:endParaRPr lang="en-US"/>
           </a:p>
@@ -2069,7 +2069,7 @@
           <a:p>
             <a:fld id="{7E19F9DA-EED9-48BD-8697-73F995D738AF}" type="datetimeFigureOut">
               <a:rPr lang="en-US" smtClean="0"/>
-              <a:t>5/23/2021</a:t>
+              <a:t>6/2/2021</a:t>
             </a:fld>
             <a:endParaRPr lang="en-US"/>
           </a:p>
@@ -2380,7 +2380,7 @@
           <a:p>
             <a:fld id="{7E19F9DA-EED9-48BD-8697-73F995D738AF}" type="datetimeFigureOut">
               <a:rPr lang="en-US" smtClean="0"/>
-              <a:t>5/23/2021</a:t>
+              <a:t>6/2/2021</a:t>
             </a:fld>
             <a:endParaRPr lang="en-US"/>
           </a:p>
@@ -2668,7 +2668,7 @@
           <a:p>
             <a:fld id="{7E19F9DA-EED9-48BD-8697-73F995D738AF}" type="datetimeFigureOut">
               <a:rPr lang="en-US" smtClean="0"/>
-              <a:t>5/23/2021</a:t>
+              <a:t>6/2/2021</a:t>
             </a:fld>
             <a:endParaRPr lang="en-US"/>
           </a:p>
@@ -2909,7 +2909,7 @@
           <a:p>
             <a:fld id="{7E19F9DA-EED9-48BD-8697-73F995D738AF}" type="datetimeFigureOut">
               <a:rPr lang="en-US" smtClean="0"/>
-              <a:t>5/23/2021</a:t>
+              <a:t>6/2/2021</a:t>
             </a:fld>
             <a:endParaRPr lang="en-US"/>
           </a:p>
@@ -3340,8 +3340,8 @@
         </p:nvSpPr>
         <p:spPr>
           <a:xfrm>
-            <a:off x="7675417" y="2241393"/>
-            <a:ext cx="1550357" cy="2419815"/>
+            <a:off x="7156785" y="2013608"/>
+            <a:ext cx="1178814" cy="2875386"/>
           </a:xfrm>
           <a:prstGeom prst="rect">
             <a:avLst/>
@@ -3375,7 +3375,7 @@
           <a:p>
             <a:pPr algn="ctr"/>
             <a:r>
-              <a:rPr lang="en-US" dirty="0">
+              <a:rPr lang="en-US" sz="1400" dirty="0">
                 <a:solidFill>
                   <a:schemeClr val="accent1"/>
                 </a:solidFill>
@@ -3399,7 +3399,7 @@
         </p:nvGrpSpPr>
         <p:grpSpPr>
           <a:xfrm>
-            <a:off x="8027018" y="3618571"/>
+            <a:off x="7305231" y="3795151"/>
             <a:ext cx="895816" cy="853068"/>
             <a:chOff x="6095999" y="2575932"/>
             <a:chExt cx="895816" cy="853068"/>
@@ -3448,7 +3448,7 @@
             <a:p>
               <a:pPr algn="ctr"/>
               <a:r>
-                <a:rPr lang="en-US" sz="1600" dirty="0"/>
+                <a:rPr lang="en-US" sz="1200" dirty="0"/>
                 <a:t>Influx</a:t>
               </a:r>
             </a:p>
@@ -3496,7 +3496,7 @@
             <a:lstStyle/>
             <a:p>
               <a:pPr algn="ctr"/>
-              <a:endParaRPr lang="en-US"/>
+              <a:endParaRPr lang="en-US" sz="1400"/>
             </a:p>
           </p:txBody>
         </p:sp>
@@ -3542,7 +3542,7 @@
             <a:lstStyle/>
             <a:p>
               <a:pPr algn="ctr"/>
-              <a:endParaRPr lang="en-US"/>
+              <a:endParaRPr lang="en-US" sz="1400"/>
             </a:p>
           </p:txBody>
         </p:sp>
@@ -3561,8 +3561,8 @@
         </p:nvSpPr>
         <p:spPr>
           <a:xfrm>
-            <a:off x="1580684" y="2241393"/>
-            <a:ext cx="3296115" cy="2419815"/>
+            <a:off x="1938712" y="2013609"/>
+            <a:ext cx="3250999" cy="2875384"/>
           </a:xfrm>
           <a:prstGeom prst="rect">
             <a:avLst/>
@@ -3596,7 +3596,7 @@
           <a:p>
             <a:pPr algn="ctr"/>
             <a:r>
-              <a:rPr lang="en-US" dirty="0">
+              <a:rPr lang="en-US" sz="1400" dirty="0">
                 <a:solidFill>
                   <a:schemeClr val="accent1"/>
                 </a:solidFill>
@@ -3620,8 +3620,8 @@
         </p:nvGrpSpPr>
         <p:grpSpPr>
           <a:xfrm>
-            <a:off x="3558537" y="3575226"/>
-            <a:ext cx="895816" cy="853068"/>
+            <a:off x="3264257" y="3183736"/>
+            <a:ext cx="615018" cy="585670"/>
             <a:chOff x="6095999" y="2575932"/>
             <a:chExt cx="895816" cy="853068"/>
           </a:xfrm>
@@ -3669,7 +3669,7 @@
             <a:p>
               <a:pPr algn="ctr"/>
               <a:r>
-                <a:rPr lang="en-US" sz="1600" dirty="0"/>
+                <a:rPr lang="en-US" sz="1200" dirty="0"/>
                 <a:t>Influx</a:t>
               </a:r>
             </a:p>
@@ -3717,7 +3717,7 @@
             <a:lstStyle/>
             <a:p>
               <a:pPr algn="ctr"/>
-              <a:endParaRPr lang="en-US"/>
+              <a:endParaRPr lang="en-US" sz="1400"/>
             </a:p>
           </p:txBody>
         </p:sp>
@@ -3763,7 +3763,7 @@
             <a:lstStyle/>
             <a:p>
               <a:pPr algn="ctr"/>
-              <a:endParaRPr lang="en-US"/>
+              <a:endParaRPr lang="en-US" sz="1400"/>
             </a:p>
           </p:txBody>
         </p:sp>
@@ -3782,8 +3782,8 @@
         </p:nvSpPr>
         <p:spPr>
           <a:xfrm>
-            <a:off x="9363307" y="2241393"/>
-            <a:ext cx="2468136" cy="2419815"/>
+            <a:off x="8459333" y="2013608"/>
+            <a:ext cx="1910217" cy="2875386"/>
           </a:xfrm>
           <a:prstGeom prst="rect">
             <a:avLst/>
@@ -3817,7 +3817,7 @@
           <a:p>
             <a:pPr algn="ctr"/>
             <a:r>
-              <a:rPr lang="en-US" dirty="0">
+              <a:rPr lang="en-US" sz="1400" dirty="0">
                 <a:solidFill>
                   <a:schemeClr val="accent1"/>
                 </a:solidFill>
@@ -3841,7 +3841,7 @@
         </p:nvSpPr>
         <p:spPr>
           <a:xfrm>
-            <a:off x="950133" y="2241393"/>
+            <a:off x="1308161" y="2241393"/>
             <a:ext cx="304800" cy="304800"/>
           </a:xfrm>
           <a:prstGeom prst="ellipse">
@@ -3887,7 +3887,7 @@
         </p:nvSpPr>
         <p:spPr>
           <a:xfrm>
-            <a:off x="950133" y="2713966"/>
+            <a:off x="1308161" y="2713966"/>
             <a:ext cx="304800" cy="304800"/>
           </a:xfrm>
           <a:prstGeom prst="ellipse">
@@ -3933,7 +3933,7 @@
         </p:nvSpPr>
         <p:spPr>
           <a:xfrm>
-            <a:off x="950133" y="3186539"/>
+            <a:off x="1308161" y="3186539"/>
             <a:ext cx="304800" cy="304800"/>
           </a:xfrm>
           <a:prstGeom prst="ellipse">
@@ -3979,7 +3979,7 @@
         </p:nvSpPr>
         <p:spPr>
           <a:xfrm>
-            <a:off x="950133" y="3659112"/>
+            <a:off x="1308161" y="3659112"/>
             <a:ext cx="304800" cy="304800"/>
           </a:xfrm>
           <a:prstGeom prst="ellipse">
@@ -4027,7 +4027,7 @@
         </p:nvCxnSpPr>
         <p:spPr>
           <a:xfrm flipV="1">
-            <a:off x="1254933" y="2390775"/>
+            <a:off x="1612961" y="2390775"/>
             <a:ext cx="325752" cy="3018"/>
           </a:xfrm>
           <a:prstGeom prst="line">
@@ -4066,7 +4066,7 @@
         </p:nvCxnSpPr>
         <p:spPr>
           <a:xfrm>
-            <a:off x="1254933" y="2866366"/>
+            <a:off x="1612961" y="2866366"/>
             <a:ext cx="325752" cy="659"/>
           </a:xfrm>
           <a:prstGeom prst="line">
@@ -4103,7 +4103,7 @@
         </p:nvCxnSpPr>
         <p:spPr>
           <a:xfrm>
-            <a:off x="1254933" y="3338939"/>
+            <a:off x="1612961" y="3338939"/>
             <a:ext cx="325752" cy="659"/>
           </a:xfrm>
           <a:prstGeom prst="line">
@@ -4140,7 +4140,7 @@
         </p:nvCxnSpPr>
         <p:spPr>
           <a:xfrm>
-            <a:off x="1254933" y="3807482"/>
+            <a:off x="1612961" y="3807482"/>
             <a:ext cx="325752" cy="659"/>
           </a:xfrm>
           <a:prstGeom prst="line">
@@ -4177,8 +4177,8 @@
         </p:nvSpPr>
         <p:spPr>
           <a:xfrm rot="16200000">
-            <a:off x="280577" y="2937936"/>
-            <a:ext cx="905248" cy="369332"/>
+            <a:off x="718306" y="2968713"/>
+            <a:ext cx="745845" cy="307777"/>
           </a:xfrm>
           <a:prstGeom prst="rect">
             <a:avLst/>
@@ -4192,13 +4192,18 @@
           <a:lstStyle/>
           <a:p>
             <a:r>
-              <a:rPr lang="en-US" dirty="0">
+              <a:rPr lang="en-US" sz="1400" dirty="0">
                 <a:solidFill>
                   <a:schemeClr val="accent1"/>
                 </a:solidFill>
               </a:rPr>
               <a:t>Sensors</a:t>
             </a:r>
+            <a:endParaRPr lang="en-US" dirty="0">
+              <a:solidFill>
+                <a:schemeClr val="accent1"/>
+              </a:solidFill>
+            </a:endParaRPr>
           </a:p>
         </p:txBody>
       </p:sp>
@@ -4216,8 +4221,8 @@
         </p:nvSpPr>
         <p:spPr>
           <a:xfrm>
-            <a:off x="3375718" y="3009959"/>
-            <a:ext cx="1375430" cy="353159"/>
+            <a:off x="4016807" y="3186539"/>
+            <a:ext cx="1057858" cy="353159"/>
           </a:xfrm>
           <a:prstGeom prst="rect">
             <a:avLst/>
@@ -4245,7 +4250,7 @@
           <a:p>
             <a:pPr algn="ctr"/>
             <a:r>
-              <a:rPr lang="en-US" sz="1600" dirty="0"/>
+              <a:rPr lang="en-US" sz="1200" dirty="0"/>
               <a:t>MQTT Broker</a:t>
             </a:r>
           </a:p>
@@ -4265,8 +4270,8 @@
         </p:nvSpPr>
         <p:spPr>
           <a:xfrm>
-            <a:off x="1718218" y="3009959"/>
-            <a:ext cx="1353589" cy="353159"/>
+            <a:off x="2076246" y="3186539"/>
+            <a:ext cx="988687" cy="353159"/>
           </a:xfrm>
           <a:prstGeom prst="rect">
             <a:avLst/>
@@ -4294,10 +4299,10 @@
           <a:p>
             <a:pPr algn="ctr"/>
             <a:r>
-              <a:rPr lang="en-US" sz="1600" dirty="0" err="1"/>
+              <a:rPr lang="en-US" sz="1200" dirty="0" err="1"/>
               <a:t>sensor_loop</a:t>
             </a:r>
-            <a:endParaRPr lang="en-US" sz="1600" dirty="0"/>
+            <a:endParaRPr lang="en-US" sz="1200" dirty="0"/>
           </a:p>
         </p:txBody>
       </p:sp>
@@ -4312,14 +4317,14 @@
           </p:cNvPr>
           <p:cNvCxnSpPr>
             <a:cxnSpLocks/>
-            <a:endCxn id="41" idx="1"/>
+            <a:stCxn id="42" idx="0"/>
           </p:cNvCxnSpPr>
           <p:nvPr/>
         </p:nvCxnSpPr>
         <p:spPr>
-          <a:xfrm>
-            <a:off x="3071807" y="3186538"/>
-            <a:ext cx="303911" cy="1"/>
+          <a:xfrm flipH="1" flipV="1">
+            <a:off x="2570589" y="2861202"/>
+            <a:ext cx="1" cy="325337"/>
           </a:xfrm>
           <a:prstGeom prst="straightConnector1">
             <a:avLst/>
@@ -4357,8 +4362,8 @@
         </p:nvSpPr>
         <p:spPr>
           <a:xfrm>
-            <a:off x="5987527" y="2241393"/>
-            <a:ext cx="1550357" cy="2419815"/>
+            <a:off x="5742421" y="2022740"/>
+            <a:ext cx="1290630" cy="2875386"/>
           </a:xfrm>
           <a:prstGeom prst="rect">
             <a:avLst/>
@@ -4392,7 +4397,7 @@
           <a:p>
             <a:pPr algn="ctr"/>
             <a:r>
-              <a:rPr lang="en-US" dirty="0">
+              <a:rPr lang="en-US" sz="1400" dirty="0">
                 <a:solidFill>
                   <a:schemeClr val="accent1"/>
                 </a:solidFill>
@@ -4402,12 +4407,55 @@
           </a:p>
         </p:txBody>
       </p:sp>
-      <p:sp>
-        <p:nvSpPr>
-          <p:cNvPr id="50" name="Rectangle 49">
-            <a:extLst>
-              <a:ext uri="{FF2B5EF4-FFF2-40B4-BE49-F238E27FC236}">
-                <a16:creationId xmlns:a16="http://schemas.microsoft.com/office/drawing/2014/main" id="{53B5CF59-93A5-43AF-B54C-8039FA0BF763}"/>
+      <p:cxnSp>
+        <p:nvCxnSpPr>
+          <p:cNvPr id="52" name="Straight Arrow Connector 51">
+            <a:extLst>
+              <a:ext uri="{FF2B5EF4-FFF2-40B4-BE49-F238E27FC236}">
+                <a16:creationId xmlns:a16="http://schemas.microsoft.com/office/drawing/2014/main" id="{F83C1227-6370-4526-9E46-BFC6AD0F6727}"/>
+              </a:ext>
+            </a:extLst>
+          </p:cNvPr>
+          <p:cNvCxnSpPr>
+            <a:cxnSpLocks/>
+            <a:stCxn id="41" idx="3"/>
+            <a:endCxn id="62" idx="1"/>
+          </p:cNvCxnSpPr>
+          <p:nvPr/>
+        </p:nvCxnSpPr>
+        <p:spPr>
+          <a:xfrm flipV="1">
+            <a:off x="5074665" y="3363118"/>
+            <a:ext cx="786176" cy="1"/>
+          </a:xfrm>
+          <a:prstGeom prst="straightConnector1">
+            <a:avLst/>
+          </a:prstGeom>
+          <a:ln w="12700">
+            <a:tailEnd type="triangle"/>
+          </a:ln>
+        </p:spPr>
+        <p:style>
+          <a:lnRef idx="1">
+            <a:schemeClr val="accent1"/>
+          </a:lnRef>
+          <a:fillRef idx="0">
+            <a:schemeClr val="accent1"/>
+          </a:fillRef>
+          <a:effectRef idx="0">
+            <a:schemeClr val="accent1"/>
+          </a:effectRef>
+          <a:fontRef idx="minor">
+            <a:schemeClr val="tx1"/>
+          </a:fontRef>
+        </p:style>
+      </p:cxnSp>
+      <p:sp>
+        <p:nvSpPr>
+          <p:cNvPr id="53" name="Rectangle 52">
+            <a:extLst>
+              <a:ext uri="{FF2B5EF4-FFF2-40B4-BE49-F238E27FC236}">
+                <a16:creationId xmlns:a16="http://schemas.microsoft.com/office/drawing/2014/main" id="{3045947E-B227-4D6B-8262-5F70BAF5139B}"/>
               </a:ext>
             </a:extLst>
           </p:cNvPr>
@@ -4416,8 +4464,8 @@
         </p:nvSpPr>
         <p:spPr>
           <a:xfrm>
-            <a:off x="6085910" y="3009959"/>
-            <a:ext cx="1353589" cy="353159"/>
+            <a:off x="8569318" y="3186539"/>
+            <a:ext cx="1679940" cy="353159"/>
           </a:xfrm>
           <a:prstGeom prst="rect">
             <a:avLst/>
@@ -4445,59 +4493,18 @@
           <a:p>
             <a:pPr algn="ctr"/>
             <a:r>
-              <a:rPr lang="en-US" sz="1600" dirty="0"/>
-              <a:t>MQTT Broker</a:t>
-            </a:r>
-          </a:p>
-        </p:txBody>
-      </p:sp>
-      <p:cxnSp>
-        <p:nvCxnSpPr>
-          <p:cNvPr id="52" name="Straight Arrow Connector 51">
-            <a:extLst>
-              <a:ext uri="{FF2B5EF4-FFF2-40B4-BE49-F238E27FC236}">
-                <a16:creationId xmlns:a16="http://schemas.microsoft.com/office/drawing/2014/main" id="{F83C1227-6370-4526-9E46-BFC6AD0F6727}"/>
-              </a:ext>
-            </a:extLst>
-          </p:cNvPr>
-          <p:cNvCxnSpPr>
-            <a:endCxn id="50" idx="1"/>
-          </p:cNvCxnSpPr>
-          <p:nvPr/>
-        </p:nvCxnSpPr>
-        <p:spPr>
-          <a:xfrm>
-            <a:off x="4751147" y="3186538"/>
-            <a:ext cx="1334763" cy="0"/>
-          </a:xfrm>
-          <a:prstGeom prst="straightConnector1">
-            <a:avLst/>
-          </a:prstGeom>
-          <a:ln w="12700">
-            <a:tailEnd type="triangle"/>
-          </a:ln>
-        </p:spPr>
-        <p:style>
-          <a:lnRef idx="1">
-            <a:schemeClr val="accent1"/>
-          </a:lnRef>
-          <a:fillRef idx="0">
-            <a:schemeClr val="accent1"/>
-          </a:fillRef>
-          <a:effectRef idx="0">
-            <a:schemeClr val="accent1"/>
-          </a:effectRef>
-          <a:fontRef idx="minor">
-            <a:schemeClr val="tx1"/>
-          </a:fontRef>
-        </p:style>
-      </p:cxnSp>
-      <p:sp>
-        <p:nvSpPr>
-          <p:cNvPr id="53" name="Rectangle 52">
-            <a:extLst>
-              <a:ext uri="{FF2B5EF4-FFF2-40B4-BE49-F238E27FC236}">
-                <a16:creationId xmlns:a16="http://schemas.microsoft.com/office/drawing/2014/main" id="{3045947E-B227-4D6B-8262-5F70BAF5139B}"/>
+              <a:rPr lang="en-US" sz="1200" dirty="0"/>
+              <a:t>Grafana</a:t>
+            </a:r>
+          </a:p>
+        </p:txBody>
+      </p:sp>
+      <p:sp>
+        <p:nvSpPr>
+          <p:cNvPr id="54" name="Rectangle 53">
+            <a:extLst>
+              <a:ext uri="{FF2B5EF4-FFF2-40B4-BE49-F238E27FC236}">
+                <a16:creationId xmlns:a16="http://schemas.microsoft.com/office/drawing/2014/main" id="{861815C5-7C88-4E99-95E6-CFE802DA0F87}"/>
               </a:ext>
             </a:extLst>
           </p:cNvPr>
@@ -4506,8 +4513,8 @@
         </p:nvSpPr>
         <p:spPr>
           <a:xfrm>
-            <a:off x="9515548" y="3009959"/>
-            <a:ext cx="2200202" cy="353159"/>
+            <a:off x="8569318" y="3683789"/>
+            <a:ext cx="1679937" cy="353159"/>
           </a:xfrm>
           <a:prstGeom prst="rect">
             <a:avLst/>
@@ -4535,18 +4542,18 @@
           <a:p>
             <a:pPr algn="ctr"/>
             <a:r>
-              <a:rPr lang="en-US" sz="1600" dirty="0"/>
-              <a:t>Grafana</a:t>
-            </a:r>
-          </a:p>
-        </p:txBody>
-      </p:sp>
-      <p:sp>
-        <p:nvSpPr>
-          <p:cNvPr id="54" name="Rectangle 53">
-            <a:extLst>
-              <a:ext uri="{FF2B5EF4-FFF2-40B4-BE49-F238E27FC236}">
-                <a16:creationId xmlns:a16="http://schemas.microsoft.com/office/drawing/2014/main" id="{861815C5-7C88-4E99-95E6-CFE802DA0F87}"/>
+              <a:rPr lang="en-US" sz="1200" dirty="0"/>
+              <a:t>Prometheus</a:t>
+            </a:r>
+          </a:p>
+        </p:txBody>
+      </p:sp>
+      <p:sp>
+        <p:nvSpPr>
+          <p:cNvPr id="55" name="Rectangle 54">
+            <a:extLst>
+              <a:ext uri="{FF2B5EF4-FFF2-40B4-BE49-F238E27FC236}">
+                <a16:creationId xmlns:a16="http://schemas.microsoft.com/office/drawing/2014/main" id="{C814E2F4-81D0-4026-A27D-7C8DB0157816}"/>
               </a:ext>
             </a:extLst>
           </p:cNvPr>
@@ -4555,8 +4562,8 @@
         </p:nvSpPr>
         <p:spPr>
           <a:xfrm>
-            <a:off x="9515548" y="3507209"/>
-            <a:ext cx="2200202" cy="353159"/>
+            <a:off x="8569318" y="4240571"/>
+            <a:ext cx="477738" cy="478656"/>
           </a:xfrm>
           <a:prstGeom prst="rect">
             <a:avLst/>
@@ -4583,19 +4590,16 @@
           <a:lstStyle/>
           <a:p>
             <a:pPr algn="ctr"/>
-            <a:r>
-              <a:rPr lang="en-US" sz="1600" dirty="0"/>
-              <a:t>Prometheus</a:t>
-            </a:r>
-          </a:p>
-        </p:txBody>
-      </p:sp>
-      <p:sp>
-        <p:nvSpPr>
-          <p:cNvPr id="55" name="Rectangle 54">
-            <a:extLst>
-              <a:ext uri="{FF2B5EF4-FFF2-40B4-BE49-F238E27FC236}">
-                <a16:creationId xmlns:a16="http://schemas.microsoft.com/office/drawing/2014/main" id="{C814E2F4-81D0-4026-A27D-7C8DB0157816}"/>
+            <a:endParaRPr lang="en-US" dirty="0"/>
+          </a:p>
+        </p:txBody>
+      </p:sp>
+      <p:sp>
+        <p:nvSpPr>
+          <p:cNvPr id="56" name="Rectangle 55">
+            <a:extLst>
+              <a:ext uri="{FF2B5EF4-FFF2-40B4-BE49-F238E27FC236}">
+                <a16:creationId xmlns:a16="http://schemas.microsoft.com/office/drawing/2014/main" id="{66D5B11E-B8CA-4B70-BCA9-005DDE4AA8D4}"/>
               </a:ext>
             </a:extLst>
           </p:cNvPr>
@@ -4604,8 +4608,8 @@
         </p:nvSpPr>
         <p:spPr>
           <a:xfrm>
-            <a:off x="9515548" y="3999493"/>
-            <a:ext cx="561902" cy="562982"/>
+            <a:off x="9175050" y="4240572"/>
+            <a:ext cx="477738" cy="478656"/>
           </a:xfrm>
           <a:prstGeom prst="rect">
             <a:avLst/>
@@ -4638,10 +4642,10 @@
       </p:sp>
       <p:sp>
         <p:nvSpPr>
-          <p:cNvPr id="56" name="Rectangle 55">
-            <a:extLst>
-              <a:ext uri="{FF2B5EF4-FFF2-40B4-BE49-F238E27FC236}">
-                <a16:creationId xmlns:a16="http://schemas.microsoft.com/office/drawing/2014/main" id="{66D5B11E-B8CA-4B70-BCA9-005DDE4AA8D4}"/>
+          <p:cNvPr id="57" name="Rectangle 56">
+            <a:extLst>
+              <a:ext uri="{FF2B5EF4-FFF2-40B4-BE49-F238E27FC236}">
+                <a16:creationId xmlns:a16="http://schemas.microsoft.com/office/drawing/2014/main" id="{E1F272B9-C6B9-46DB-AA30-55862BCF0253}"/>
               </a:ext>
             </a:extLst>
           </p:cNvPr>
@@ -4650,8 +4654,8 @@
         </p:nvSpPr>
         <p:spPr>
           <a:xfrm>
-            <a:off x="10334390" y="3999491"/>
-            <a:ext cx="561902" cy="562983"/>
+            <a:off x="9771519" y="4240571"/>
+            <a:ext cx="477736" cy="478656"/>
           </a:xfrm>
           <a:prstGeom prst="rect">
             <a:avLst/>
@@ -4682,52 +4686,6 @@
           </a:p>
         </p:txBody>
       </p:sp>
-      <p:sp>
-        <p:nvSpPr>
-          <p:cNvPr id="57" name="Rectangle 56">
-            <a:extLst>
-              <a:ext uri="{FF2B5EF4-FFF2-40B4-BE49-F238E27FC236}">
-                <a16:creationId xmlns:a16="http://schemas.microsoft.com/office/drawing/2014/main" id="{E1F272B9-C6B9-46DB-AA30-55862BCF0253}"/>
-              </a:ext>
-            </a:extLst>
-          </p:cNvPr>
-          <p:cNvSpPr/>
-          <p:nvPr/>
-        </p:nvSpPr>
-        <p:spPr>
-          <a:xfrm>
-            <a:off x="11153232" y="3999491"/>
-            <a:ext cx="561902" cy="562984"/>
-          </a:xfrm>
-          <a:prstGeom prst="rect">
-            <a:avLst/>
-          </a:prstGeom>
-        </p:spPr>
-        <p:style>
-          <a:lnRef idx="2">
-            <a:schemeClr val="accent1">
-              <a:shade val="50000"/>
-            </a:schemeClr>
-          </a:lnRef>
-          <a:fillRef idx="1">
-            <a:schemeClr val="accent1"/>
-          </a:fillRef>
-          <a:effectRef idx="0">
-            <a:schemeClr val="accent1"/>
-          </a:effectRef>
-          <a:fontRef idx="minor">
-            <a:schemeClr val="lt1"/>
-          </a:fontRef>
-        </p:style>
-        <p:txBody>
-          <a:bodyPr rtlCol="0" anchor="ctr"/>
-          <a:lstStyle/>
-          <a:p>
-            <a:pPr algn="ctr"/>
-            <a:endParaRPr lang="en-US" dirty="0"/>
-          </a:p>
-        </p:txBody>
-      </p:sp>
       <p:cxnSp>
         <p:nvCxnSpPr>
           <p:cNvPr id="59" name="Connector: Elbow 58">
@@ -4739,15 +4697,15 @@
           </p:cNvPr>
           <p:cNvCxnSpPr>
             <a:cxnSpLocks/>
-            <a:stCxn id="50" idx="3"/>
+            <a:stCxn id="62" idx="3"/>
             <a:endCxn id="16" idx="1"/>
           </p:cNvCxnSpPr>
           <p:nvPr/>
         </p:nvCxnSpPr>
         <p:spPr>
           <a:xfrm>
-            <a:off x="7439499" y="3186539"/>
-            <a:ext cx="718709" cy="459794"/>
+            <a:off x="6918699" y="3363118"/>
+            <a:ext cx="517722" cy="459795"/>
           </a:xfrm>
           <a:prstGeom prst="bentConnector2">
             <a:avLst/>
@@ -4781,14 +4739,16 @@
             </a:extLst>
           </p:cNvPr>
           <p:cNvCxnSpPr>
+            <a:cxnSpLocks/>
             <a:stCxn id="16" idx="7"/>
+            <a:endCxn id="53" idx="1"/>
           </p:cNvCxnSpPr>
           <p:nvPr/>
         </p:nvCxnSpPr>
         <p:spPr>
           <a:xfrm rot="5400000" flipH="1" flipV="1">
-            <a:off x="8923699" y="3054485"/>
-            <a:ext cx="459795" cy="723903"/>
+            <a:off x="8089691" y="3343286"/>
+            <a:ext cx="459794" cy="499460"/>
           </a:xfrm>
           <a:prstGeom prst="bentConnector2">
             <a:avLst/>
@@ -4872,7 +4832,7 @@
         </p:nvSpPr>
         <p:spPr>
           <a:xfrm>
-            <a:off x="5987527" y="5406656"/>
+            <a:off x="5742421" y="5406656"/>
             <a:ext cx="1007199" cy="369332"/>
           </a:xfrm>
           <a:prstGeom prst="rect">
@@ -4913,7 +4873,7 @@
         </p:nvSpPr>
         <p:spPr>
           <a:xfrm>
-            <a:off x="1580684" y="5406656"/>
+            <a:off x="1938712" y="5406656"/>
             <a:ext cx="637803" cy="369332"/>
           </a:xfrm>
           <a:prstGeom prst="rect">
@@ -4942,48 +4902,6 @@
       </p:sp>
       <p:cxnSp>
         <p:nvCxnSpPr>
-          <p:cNvPr id="43" name="Straight Arrow Connector 42">
-            <a:extLst>
-              <a:ext uri="{FF2B5EF4-FFF2-40B4-BE49-F238E27FC236}">
-                <a16:creationId xmlns:a16="http://schemas.microsoft.com/office/drawing/2014/main" id="{38851A94-A61C-40AD-84BA-DE19329AC0FB}"/>
-              </a:ext>
-            </a:extLst>
-          </p:cNvPr>
-          <p:cNvCxnSpPr>
-            <a:cxnSpLocks/>
-            <a:endCxn id="21" idx="0"/>
-          </p:cNvCxnSpPr>
-          <p:nvPr/>
-        </p:nvCxnSpPr>
-        <p:spPr>
-          <a:xfrm>
-            <a:off x="4006446" y="3363118"/>
-            <a:ext cx="0" cy="212108"/>
-          </a:xfrm>
-          <a:prstGeom prst="straightConnector1">
-            <a:avLst/>
-          </a:prstGeom>
-          <a:ln w="12700">
-            <a:tailEnd type="triangle"/>
-          </a:ln>
-        </p:spPr>
-        <p:style>
-          <a:lnRef idx="1">
-            <a:schemeClr val="accent1"/>
-          </a:lnRef>
-          <a:fillRef idx="0">
-            <a:schemeClr val="accent1"/>
-          </a:fillRef>
-          <a:effectRef idx="0">
-            <a:schemeClr val="accent1"/>
-          </a:effectRef>
-          <a:fontRef idx="minor">
-            <a:schemeClr val="tx1"/>
-          </a:fontRef>
-        </p:style>
-      </p:cxnSp>
-      <p:cxnSp>
-        <p:nvCxnSpPr>
           <p:cNvPr id="46" name="Straight Arrow Connector 45">
             <a:extLst>
               <a:ext uri="{FF2B5EF4-FFF2-40B4-BE49-F238E27FC236}">
@@ -4999,8 +4917,8 @@
         </p:nvCxnSpPr>
         <p:spPr>
           <a:xfrm flipV="1">
-            <a:off x="9796499" y="3860368"/>
-            <a:ext cx="0" cy="139125"/>
+            <a:off x="8808187" y="4048116"/>
+            <a:ext cx="0" cy="192455"/>
           </a:xfrm>
           <a:prstGeom prst="straightConnector1">
             <a:avLst/>
@@ -5036,14 +4954,13 @@
           <p:cNvCxnSpPr>
             <a:cxnSpLocks/>
             <a:stCxn id="56" idx="0"/>
-            <a:endCxn id="54" idx="2"/>
           </p:cNvCxnSpPr>
           <p:nvPr/>
         </p:nvCxnSpPr>
         <p:spPr>
           <a:xfrm flipV="1">
-            <a:off x="10615341" y="3860368"/>
-            <a:ext cx="308" cy="139123"/>
+            <a:off x="9413919" y="4036948"/>
+            <a:ext cx="0" cy="203624"/>
           </a:xfrm>
           <a:prstGeom prst="straightConnector1">
             <a:avLst/>
@@ -5084,8 +5001,8 @@
         </p:nvCxnSpPr>
         <p:spPr>
           <a:xfrm flipV="1">
-            <a:off x="11434183" y="3860368"/>
-            <a:ext cx="0" cy="139123"/>
+            <a:off x="10010387" y="4048116"/>
+            <a:ext cx="0" cy="192455"/>
           </a:xfrm>
           <a:prstGeom prst="straightConnector1">
             <a:avLst/>
@@ -5126,11 +5043,348 @@
         </p:nvCxnSpPr>
         <p:spPr>
           <a:xfrm flipV="1">
-            <a:off x="10615649" y="3363118"/>
-            <a:ext cx="0" cy="144091"/>
+            <a:off x="9409287" y="3552536"/>
+            <a:ext cx="0" cy="131253"/>
           </a:xfrm>
           <a:prstGeom prst="straightConnector1">
             <a:avLst/>
+          </a:prstGeom>
+          <a:ln w="12700">
+            <a:tailEnd type="triangle"/>
+          </a:ln>
+        </p:spPr>
+        <p:style>
+          <a:lnRef idx="1">
+            <a:schemeClr val="accent1"/>
+          </a:lnRef>
+          <a:fillRef idx="0">
+            <a:schemeClr val="accent1"/>
+          </a:fillRef>
+          <a:effectRef idx="0">
+            <a:schemeClr val="accent1"/>
+          </a:effectRef>
+          <a:fontRef idx="minor">
+            <a:schemeClr val="tx1"/>
+          </a:fontRef>
+        </p:style>
+      </p:cxnSp>
+      <p:sp>
+        <p:nvSpPr>
+          <p:cNvPr id="48" name="Rectangle 47">
+            <a:extLst>
+              <a:ext uri="{FF2B5EF4-FFF2-40B4-BE49-F238E27FC236}">
+                <a16:creationId xmlns:a16="http://schemas.microsoft.com/office/drawing/2014/main" id="{13B99750-7329-46E2-A3E2-76D0529077FC}"/>
+              </a:ext>
+            </a:extLst>
+          </p:cNvPr>
+          <p:cNvSpPr/>
+          <p:nvPr/>
+        </p:nvSpPr>
+        <p:spPr>
+          <a:xfrm>
+            <a:off x="2076246" y="2628978"/>
+            <a:ext cx="2998419" cy="232224"/>
+          </a:xfrm>
+          <a:prstGeom prst="rect">
+            <a:avLst/>
+          </a:prstGeom>
+        </p:spPr>
+        <p:style>
+          <a:lnRef idx="2">
+            <a:schemeClr val="accent1">
+              <a:shade val="50000"/>
+            </a:schemeClr>
+          </a:lnRef>
+          <a:fillRef idx="1">
+            <a:schemeClr val="accent1"/>
+          </a:fillRef>
+          <a:effectRef idx="0">
+            <a:schemeClr val="accent1"/>
+          </a:effectRef>
+          <a:fontRef idx="minor">
+            <a:schemeClr val="lt1"/>
+          </a:fontRef>
+        </p:style>
+        <p:txBody>
+          <a:bodyPr rtlCol="0" anchor="ctr"/>
+          <a:lstStyle/>
+          <a:p>
+            <a:pPr algn="ctr"/>
+            <a:r>
+              <a:rPr lang="en-US" sz="1200" dirty="0"/>
+              <a:t>weather0 Bridge Network</a:t>
+            </a:r>
+          </a:p>
+        </p:txBody>
+      </p:sp>
+      <p:cxnSp>
+        <p:nvCxnSpPr>
+          <p:cNvPr id="60" name="Straight Arrow Connector 59">
+            <a:extLst>
+              <a:ext uri="{FF2B5EF4-FFF2-40B4-BE49-F238E27FC236}">
+                <a16:creationId xmlns:a16="http://schemas.microsoft.com/office/drawing/2014/main" id="{D907C5B4-7F05-48BB-8B8C-7010ABE370F0}"/>
+              </a:ext>
+            </a:extLst>
+          </p:cNvPr>
+          <p:cNvCxnSpPr>
+            <a:cxnSpLocks/>
+            <a:stCxn id="41" idx="0"/>
+          </p:cNvCxnSpPr>
+          <p:nvPr/>
+        </p:nvCxnSpPr>
+        <p:spPr>
+          <a:xfrm flipV="1">
+            <a:off x="4545736" y="2861202"/>
+            <a:ext cx="0" cy="325337"/>
+          </a:xfrm>
+          <a:prstGeom prst="straightConnector1">
+            <a:avLst/>
+          </a:prstGeom>
+          <a:ln w="12700">
+            <a:headEnd type="triangle"/>
+            <a:tailEnd type="none"/>
+          </a:ln>
+        </p:spPr>
+        <p:style>
+          <a:lnRef idx="1">
+            <a:schemeClr val="accent1"/>
+          </a:lnRef>
+          <a:fillRef idx="0">
+            <a:schemeClr val="accent1"/>
+          </a:fillRef>
+          <a:effectRef idx="0">
+            <a:schemeClr val="accent1"/>
+          </a:effectRef>
+          <a:fontRef idx="minor">
+            <a:schemeClr val="tx1"/>
+          </a:fontRef>
+        </p:style>
+      </p:cxnSp>
+      <p:cxnSp>
+        <p:nvCxnSpPr>
+          <p:cNvPr id="61" name="Straight Arrow Connector 60">
+            <a:extLst>
+              <a:ext uri="{FF2B5EF4-FFF2-40B4-BE49-F238E27FC236}">
+                <a16:creationId xmlns:a16="http://schemas.microsoft.com/office/drawing/2014/main" id="{422D95FD-C01A-4138-8F91-291B6D726FFF}"/>
+              </a:ext>
+            </a:extLst>
+          </p:cNvPr>
+          <p:cNvCxnSpPr>
+            <a:cxnSpLocks/>
+            <a:endCxn id="21" idx="0"/>
+          </p:cNvCxnSpPr>
+          <p:nvPr/>
+        </p:nvCxnSpPr>
+        <p:spPr>
+          <a:xfrm>
+            <a:off x="3568152" y="2088326"/>
+            <a:ext cx="3615" cy="1095410"/>
+          </a:xfrm>
+          <a:prstGeom prst="straightConnector1">
+            <a:avLst/>
+          </a:prstGeom>
+          <a:ln w="12700">
+            <a:headEnd type="triangle"/>
+            <a:tailEnd type="triangle"/>
+          </a:ln>
+        </p:spPr>
+        <p:style>
+          <a:lnRef idx="1">
+            <a:schemeClr val="accent1"/>
+          </a:lnRef>
+          <a:fillRef idx="0">
+            <a:schemeClr val="accent1"/>
+          </a:fillRef>
+          <a:effectRef idx="0">
+            <a:schemeClr val="accent1"/>
+          </a:effectRef>
+          <a:fontRef idx="minor">
+            <a:schemeClr val="tx1"/>
+          </a:fontRef>
+        </p:style>
+      </p:cxnSp>
+      <p:sp>
+        <p:nvSpPr>
+          <p:cNvPr id="62" name="Rectangle 61">
+            <a:extLst>
+              <a:ext uri="{FF2B5EF4-FFF2-40B4-BE49-F238E27FC236}">
+                <a16:creationId xmlns:a16="http://schemas.microsoft.com/office/drawing/2014/main" id="{FA1A772C-B357-4784-B39E-6118C3C6F464}"/>
+              </a:ext>
+            </a:extLst>
+          </p:cNvPr>
+          <p:cNvSpPr/>
+          <p:nvPr/>
+        </p:nvSpPr>
+        <p:spPr>
+          <a:xfrm>
+            <a:off x="5860841" y="3186538"/>
+            <a:ext cx="1057858" cy="353159"/>
+          </a:xfrm>
+          <a:prstGeom prst="rect">
+            <a:avLst/>
+          </a:prstGeom>
+        </p:spPr>
+        <p:style>
+          <a:lnRef idx="2">
+            <a:schemeClr val="accent1">
+              <a:shade val="50000"/>
+            </a:schemeClr>
+          </a:lnRef>
+          <a:fillRef idx="1">
+            <a:schemeClr val="accent1"/>
+          </a:fillRef>
+          <a:effectRef idx="0">
+            <a:schemeClr val="accent1"/>
+          </a:effectRef>
+          <a:fontRef idx="minor">
+            <a:schemeClr val="lt1"/>
+          </a:fontRef>
+        </p:style>
+        <p:txBody>
+          <a:bodyPr rtlCol="0" anchor="ctr"/>
+          <a:lstStyle/>
+          <a:p>
+            <a:pPr algn="ctr"/>
+            <a:r>
+              <a:rPr lang="en-US" sz="1200" dirty="0"/>
+              <a:t>MQTT Broker</a:t>
+            </a:r>
+          </a:p>
+        </p:txBody>
+      </p:sp>
+      <p:sp>
+        <p:nvSpPr>
+          <p:cNvPr id="97" name="Rectangle 96">
+            <a:extLst>
+              <a:ext uri="{FF2B5EF4-FFF2-40B4-BE49-F238E27FC236}">
+                <a16:creationId xmlns:a16="http://schemas.microsoft.com/office/drawing/2014/main" id="{28ADFB8C-C991-456F-9FA2-B561106F729A}"/>
+              </a:ext>
+            </a:extLst>
+          </p:cNvPr>
+          <p:cNvSpPr/>
+          <p:nvPr/>
+        </p:nvSpPr>
+        <p:spPr>
+          <a:xfrm>
+            <a:off x="10495044" y="2022740"/>
+            <a:ext cx="1178814" cy="2875386"/>
+          </a:xfrm>
+          <a:prstGeom prst="rect">
+            <a:avLst/>
+          </a:prstGeom>
+          <a:solidFill>
+            <a:schemeClr val="accent5">
+              <a:lumMod val="40000"/>
+              <a:lumOff val="60000"/>
+            </a:schemeClr>
+          </a:solidFill>
+        </p:spPr>
+        <p:style>
+          <a:lnRef idx="2">
+            <a:schemeClr val="accent1">
+              <a:shade val="50000"/>
+            </a:schemeClr>
+          </a:lnRef>
+          <a:fillRef idx="1">
+            <a:schemeClr val="accent1"/>
+          </a:fillRef>
+          <a:effectRef idx="0">
+            <a:schemeClr val="accent1"/>
+          </a:effectRef>
+          <a:fontRef idx="minor">
+            <a:schemeClr val="lt1"/>
+          </a:fontRef>
+        </p:style>
+        <p:txBody>
+          <a:bodyPr rtlCol="0" anchor="t" anchorCtr="0"/>
+          <a:lstStyle/>
+          <a:p>
+            <a:pPr algn="ctr"/>
+            <a:r>
+              <a:rPr lang="en-US" sz="1400" dirty="0">
+                <a:solidFill>
+                  <a:schemeClr val="accent1"/>
+                </a:solidFill>
+              </a:rPr>
+              <a:t>Home Assistant</a:t>
+            </a:r>
+          </a:p>
+        </p:txBody>
+      </p:sp>
+      <p:sp>
+        <p:nvSpPr>
+          <p:cNvPr id="102" name="Rectangle 101">
+            <a:extLst>
+              <a:ext uri="{FF2B5EF4-FFF2-40B4-BE49-F238E27FC236}">
+                <a16:creationId xmlns:a16="http://schemas.microsoft.com/office/drawing/2014/main" id="{2FB76B39-2243-478F-A6B7-7C59E5D4F98B}"/>
+              </a:ext>
+            </a:extLst>
+          </p:cNvPr>
+          <p:cNvSpPr/>
+          <p:nvPr/>
+        </p:nvSpPr>
+        <p:spPr>
+          <a:xfrm>
+            <a:off x="10590459" y="3183737"/>
+            <a:ext cx="978274" cy="1535490"/>
+          </a:xfrm>
+          <a:prstGeom prst="rect">
+            <a:avLst/>
+          </a:prstGeom>
+        </p:spPr>
+        <p:style>
+          <a:lnRef idx="2">
+            <a:schemeClr val="accent1">
+              <a:shade val="50000"/>
+            </a:schemeClr>
+          </a:lnRef>
+          <a:fillRef idx="1">
+            <a:schemeClr val="accent1"/>
+          </a:fillRef>
+          <a:effectRef idx="0">
+            <a:schemeClr val="accent1"/>
+          </a:effectRef>
+          <a:fontRef idx="minor">
+            <a:schemeClr val="lt1"/>
+          </a:fontRef>
+        </p:style>
+        <p:txBody>
+          <a:bodyPr rtlCol="0" anchor="ctr"/>
+          <a:lstStyle/>
+          <a:p>
+            <a:pPr algn="ctr"/>
+            <a:r>
+              <a:rPr lang="en-US" sz="1200" dirty="0"/>
+              <a:t>Home Assistant</a:t>
+            </a:r>
+          </a:p>
+        </p:txBody>
+      </p:sp>
+      <p:cxnSp>
+        <p:nvCxnSpPr>
+          <p:cNvPr id="103" name="Connector: Elbow 102">
+            <a:extLst>
+              <a:ext uri="{FF2B5EF4-FFF2-40B4-BE49-F238E27FC236}">
+                <a16:creationId xmlns:a16="http://schemas.microsoft.com/office/drawing/2014/main" id="{5738BE22-D835-4622-BA3B-56FE44B43C24}"/>
+              </a:ext>
+            </a:extLst>
+          </p:cNvPr>
+          <p:cNvCxnSpPr>
+            <a:cxnSpLocks/>
+            <a:stCxn id="62" idx="2"/>
+            <a:endCxn id="102" idx="2"/>
+          </p:cNvCxnSpPr>
+          <p:nvPr/>
+        </p:nvCxnSpPr>
+        <p:spPr>
+          <a:xfrm rot="16200000" flipH="1">
+            <a:off x="8144918" y="1784549"/>
+            <a:ext cx="1179530" cy="4689826"/>
+          </a:xfrm>
+          <a:prstGeom prst="bentConnector3">
+            <a:avLst>
+              <a:gd name="adj1" fmla="val 146514"/>
+            </a:avLst>
           </a:prstGeom>
           <a:ln w="12700">
             <a:tailEnd type="triangle"/>

</xml_diff>